<commit_message>
added updated power point
</commit_message>
<xml_diff>
--- a/Project1 dendrite presentation.pptx
+++ b/Project1 dendrite presentation.pptx
@@ -110,6 +110,11 @@
       </a:defRPr>
     </a:lvl9pPr>
   </p:defaultTextStyle>
+  <p:extLst>
+    <p:ext uri="{EFAFB233-063F-42B5-8137-9DF3F51BA10A}">
+      <p15:sldGuideLst xmlns:p15="http://schemas.microsoft.com/office/powerpoint/2012/main"/>
+    </p:ext>
+  </p:extLst>
 </p:presentation>
 </file>
 
@@ -260,7 +265,7 @@
           <a:p>
             <a:fld id="{B28C46C0-639E-40E6-ABCC-3672F66DD509}" type="datetimeFigureOut">
               <a:rPr lang="en-US" smtClean="0"/>
-              <a:t>11/17/2020</a:t>
+              <a:t>11/19/2020</a:t>
             </a:fld>
             <a:endParaRPr lang="en-US"/>
           </a:p>
@@ -458,7 +463,7 @@
           <a:p>
             <a:fld id="{B28C46C0-639E-40E6-ABCC-3672F66DD509}" type="datetimeFigureOut">
               <a:rPr lang="en-US" smtClean="0"/>
-              <a:t>11/17/2020</a:t>
+              <a:t>11/19/2020</a:t>
             </a:fld>
             <a:endParaRPr lang="en-US"/>
           </a:p>
@@ -666,7 +671,7 @@
           <a:p>
             <a:fld id="{B28C46C0-639E-40E6-ABCC-3672F66DD509}" type="datetimeFigureOut">
               <a:rPr lang="en-US" smtClean="0"/>
-              <a:t>11/17/2020</a:t>
+              <a:t>11/19/2020</a:t>
             </a:fld>
             <a:endParaRPr lang="en-US"/>
           </a:p>
@@ -864,7 +869,7 @@
           <a:p>
             <a:fld id="{B28C46C0-639E-40E6-ABCC-3672F66DD509}" type="datetimeFigureOut">
               <a:rPr lang="en-US" smtClean="0"/>
-              <a:t>11/17/2020</a:t>
+              <a:t>11/19/2020</a:t>
             </a:fld>
             <a:endParaRPr lang="en-US"/>
           </a:p>
@@ -1139,7 +1144,7 @@
           <a:p>
             <a:fld id="{B28C46C0-639E-40E6-ABCC-3672F66DD509}" type="datetimeFigureOut">
               <a:rPr lang="en-US" smtClean="0"/>
-              <a:t>11/17/2020</a:t>
+              <a:t>11/19/2020</a:t>
             </a:fld>
             <a:endParaRPr lang="en-US"/>
           </a:p>
@@ -1404,7 +1409,7 @@
           <a:p>
             <a:fld id="{B28C46C0-639E-40E6-ABCC-3672F66DD509}" type="datetimeFigureOut">
               <a:rPr lang="en-US" smtClean="0"/>
-              <a:t>11/17/2020</a:t>
+              <a:t>11/19/2020</a:t>
             </a:fld>
             <a:endParaRPr lang="en-US"/>
           </a:p>
@@ -1816,7 +1821,7 @@
           <a:p>
             <a:fld id="{B28C46C0-639E-40E6-ABCC-3672F66DD509}" type="datetimeFigureOut">
               <a:rPr lang="en-US" smtClean="0"/>
-              <a:t>11/17/2020</a:t>
+              <a:t>11/19/2020</a:t>
             </a:fld>
             <a:endParaRPr lang="en-US"/>
           </a:p>
@@ -1957,7 +1962,7 @@
           <a:p>
             <a:fld id="{B28C46C0-639E-40E6-ABCC-3672F66DD509}" type="datetimeFigureOut">
               <a:rPr lang="en-US" smtClean="0"/>
-              <a:t>11/17/2020</a:t>
+              <a:t>11/19/2020</a:t>
             </a:fld>
             <a:endParaRPr lang="en-US"/>
           </a:p>
@@ -2070,7 +2075,7 @@
           <a:p>
             <a:fld id="{B28C46C0-639E-40E6-ABCC-3672F66DD509}" type="datetimeFigureOut">
               <a:rPr lang="en-US" smtClean="0"/>
-              <a:t>11/17/2020</a:t>
+              <a:t>11/19/2020</a:t>
             </a:fld>
             <a:endParaRPr lang="en-US"/>
           </a:p>
@@ -2381,7 +2386,7 @@
           <a:p>
             <a:fld id="{B28C46C0-639E-40E6-ABCC-3672F66DD509}" type="datetimeFigureOut">
               <a:rPr lang="en-US" smtClean="0"/>
-              <a:t>11/17/2020</a:t>
+              <a:t>11/19/2020</a:t>
             </a:fld>
             <a:endParaRPr lang="en-US"/>
           </a:p>
@@ -2669,7 +2674,7 @@
           <a:p>
             <a:fld id="{B28C46C0-639E-40E6-ABCC-3672F66DD509}" type="datetimeFigureOut">
               <a:rPr lang="en-US" smtClean="0"/>
-              <a:t>11/17/2020</a:t>
+              <a:t>11/19/2020</a:t>
             </a:fld>
             <a:endParaRPr lang="en-US"/>
           </a:p>
@@ -2910,7 +2915,7 @@
           <a:p>
             <a:fld id="{B28C46C0-639E-40E6-ABCC-3672F66DD509}" type="datetimeFigureOut">
               <a:rPr lang="en-US" smtClean="0"/>
-              <a:t>11/17/2020</a:t>
+              <a:t>11/19/2020</a:t>
             </a:fld>
             <a:endParaRPr lang="en-US"/>
           </a:p>
@@ -3350,7 +3355,7 @@
           <a:p>
             <a:r>
               <a:rPr lang="en-US" dirty="0"/>
-              <a:t>Project Title</a:t>
+              <a:t>Word of the Day</a:t>
             </a:r>
           </a:p>
         </p:txBody>
@@ -3376,10 +3381,7 @@
           <a:bodyPr/>
           <a:lstStyle/>
           <a:p>
-            <a:r>
-              <a:rPr lang="en-US" dirty="0"/>
-              <a:t>Hurray!</a:t>
-            </a:r>
+            <a:endParaRPr lang="en-US" dirty="0"/>
           </a:p>
         </p:txBody>
       </p:sp>
@@ -3431,12 +3433,14 @@
         </p:nvSpPr>
         <p:spPr/>
         <p:txBody>
-          <a:bodyPr/>
-          <a:lstStyle/>
-          <a:p>
-            <a:r>
-              <a:rPr lang="en-US" dirty="0"/>
-              <a:t>Elevator Pitch</a:t>
+          <a:bodyPr>
+            <a:normAutofit/>
+          </a:bodyPr>
+          <a:lstStyle/>
+          <a:p>
+            <a:r>
+              <a:rPr lang="en-US" sz="1400" dirty="0"/>
+              <a:t>Word of the day provides an accessible way to learn new information in the method of your choosing.  Pick from a series of time tested memorization methods and practices, to begin your journey of expandable knowledge.  </a:t>
             </a:r>
           </a:p>
         </p:txBody>
@@ -3462,7 +3466,7 @@
           <a:bodyPr/>
           <a:lstStyle/>
           <a:p>
-            <a:endParaRPr lang="en-US"/>
+            <a:endParaRPr lang="en-US" dirty="0"/>
           </a:p>
         </p:txBody>
       </p:sp>
@@ -3542,24 +3546,32 @@
         </p:nvSpPr>
         <p:spPr/>
         <p:txBody>
-          <a:bodyPr/>
+          <a:bodyPr>
+            <a:normAutofit fontScale="92500" lnSpcReduction="10000"/>
+          </a:bodyPr>
           <a:lstStyle/>
           <a:p>
             <a:r>
               <a:rPr lang="en-US" dirty="0"/>
-              <a:t>Description</a:t>
-            </a:r>
+              <a:t>Description: The word of the day application helps a wide variety of individuals learn in a more personal manner.  Retention of information can be difficult for many people, but this does not mean there is a physical flaw or lack of work ethic.  By using “Word of the Day,” we can cultivate our educational process, by having the correct tools in our tool bag.</a:t>
+            </a:r>
+          </a:p>
+          <a:p>
+            <a:endParaRPr lang="en-US" dirty="0"/>
           </a:p>
           <a:p>
             <a:r>
               <a:rPr lang="en-US" dirty="0"/>
-              <a:t>Motivation for development?</a:t>
-            </a:r>
+              <a:t>Motivation for development?: Bootcamps are a melting pot of ages, life experiences, and educational levels.  Working through a group challenge brings the need for productive educational tools.</a:t>
+            </a:r>
+          </a:p>
+          <a:p>
+            <a:endParaRPr lang="en-US" dirty="0"/>
           </a:p>
           <a:p>
             <a:r>
               <a:rPr lang="en-US" dirty="0"/>
-              <a:t>User story</a:t>
+              <a:t>User story: (probably will just leave this one out)</a:t>
             </a:r>
           </a:p>
         </p:txBody>
@@ -3645,25 +3657,49 @@
           <a:p>
             <a:r>
               <a:rPr lang="en-US" dirty="0"/>
-              <a:t>Technologies used</a:t>
-            </a:r>
-          </a:p>
-          <a:p>
+              <a:t>Technologies uses: HTML, CSS, JavaScript, </a:t>
+            </a:r>
+            <a:r>
+              <a:rPr lang="en-US" dirty="0" err="1"/>
+              <a:t>Bulma</a:t>
+            </a:r>
             <a:r>
               <a:rPr lang="en-US" dirty="0"/>
-              <a:t>Breakdown of tasks and roles</a:t>
+              <a:t> (CSS framework)</a:t>
             </a:r>
           </a:p>
           <a:p>
             <a:r>
               <a:rPr lang="en-US" dirty="0"/>
-              <a:t>Challenges</a:t>
-            </a:r>
-          </a:p>
-          <a:p>
+              <a:t>Breakdown of tasks and roles: As a team we talked through the and developed the concept.  Taking on design tasks and learning </a:t>
+            </a:r>
+            <a:r>
+              <a:rPr lang="en-US" dirty="0" err="1"/>
+              <a:t>Bulma</a:t>
+            </a:r>
             <a:r>
               <a:rPr lang="en-US" dirty="0"/>
-              <a:t>Successes</a:t>
+              <a:t> as a group.  Julian led the team in functionality with his knowledge of JavaScript.  </a:t>
+            </a:r>
+          </a:p>
+          <a:p>
+            <a:r>
+              <a:rPr lang="en-US" dirty="0"/>
+              <a:t>Challenges: Individual work schedules.  Different skill levels, </a:t>
+            </a:r>
+            <a:r>
+              <a:rPr lang="en-US" dirty="0" err="1"/>
+              <a:t>Covid</a:t>
+            </a:r>
+            <a:r>
+              <a:rPr lang="en-US" dirty="0"/>
+              <a:t>!</a:t>
+            </a:r>
+          </a:p>
+          <a:p>
+            <a:r>
+              <a:rPr lang="en-US" dirty="0"/>
+              <a:t>Successes: Being able to learn an unfamiliar framework, working as a team, and having a product to be proud of.  </a:t>
             </a:r>
           </a:p>
         </p:txBody>
@@ -3830,7 +3866,10 @@
           <a:bodyPr/>
           <a:lstStyle/>
           <a:p>
-            <a:endParaRPr lang="en-US"/>
+            <a:r>
+              <a:rPr lang="en-US" dirty="0"/>
+              <a:t>The application could potentially be developed to have more diverse functionality.  The random educational topics, as well as, the learning methods could always be expanded.  A challenge section could be provided to test the retention of the information selected on a daily level.  </a:t>
+            </a:r>
           </a:p>
         </p:txBody>
       </p:sp>

</xml_diff>